<commit_message>
added gears to readme
</commit_message>
<xml_diff>
--- a/slides.pptx
+++ b/slides.pptx
@@ -909,8 +909,15 @@
         <a:lstStyle/>
         <a:p>
           <a:r>
-            <a:rPr lang="en-US" sz="1800" dirty="0"/>
-            <a:t>Impact statements in every publication</a:t>
+            <a:rPr lang="en-US" sz="2000" dirty="0"/>
+            <a:t>Impact statements</a:t>
+          </a:r>
+          <a:br>
+            <a:rPr lang="en-US" sz="2000" dirty="0"/>
+          </a:br>
+          <a:r>
+            <a:rPr lang="en-US" sz="2000" dirty="0"/>
+            <a:t>in every publication</a:t>
           </a:r>
         </a:p>
       </dgm:t>
@@ -938,14 +945,14 @@
       </dgm:t>
     </dgm:pt>
     <dgm:pt modelId="{775FE33B-2036-4AC3-8AB7-3F16FC5D8842}">
-      <dgm:prSet phldrT="[Text]"/>
+      <dgm:prSet phldrT="[Text]" custT="1"/>
       <dgm:spPr/>
       <dgm:t>
         <a:bodyPr/>
         <a:lstStyle/>
         <a:p>
           <a:r>
-            <a:rPr lang="en-US" dirty="0"/>
+            <a:rPr lang="en-US" sz="1400" dirty="0"/>
             <a:t>Individual awareness</a:t>
           </a:r>
         </a:p>
@@ -1193,12 +1200,12 @@
         </a:fontRef>
       </dsp:style>
       <dsp:txBody>
-        <a:bodyPr spcFirstLastPara="0" vert="horz" wrap="square" lIns="22860" tIns="22860" rIns="22860" bIns="22860" numCol="1" spcCol="1270" anchor="ctr" anchorCtr="0">
+        <a:bodyPr spcFirstLastPara="0" vert="horz" wrap="square" lIns="25400" tIns="25400" rIns="25400" bIns="25400" numCol="1" spcCol="1270" anchor="ctr" anchorCtr="0">
           <a:noAutofit/>
         </a:bodyPr>
         <a:lstStyle/>
         <a:p>
-          <a:pPr marL="0" lvl="0" indent="0" algn="ctr" defTabSz="800100">
+          <a:pPr marL="0" lvl="0" indent="0" algn="ctr" defTabSz="889000">
             <a:lnSpc>
               <a:spcPct val="90000"/>
             </a:lnSpc>
@@ -1211,8 +1218,15 @@
             <a:buNone/>
           </a:pPr>
           <a:r>
-            <a:rPr lang="en-US" sz="1800" kern="1200" dirty="0"/>
-            <a:t>Impact statements in every publication</a:t>
+            <a:rPr lang="en-US" sz="2000" kern="1200" dirty="0"/>
+            <a:t>Impact statements</a:t>
+          </a:r>
+          <a:br>
+            <a:rPr lang="en-US" sz="2000" kern="1200" dirty="0"/>
+          </a:br>
+          <a:r>
+            <a:rPr lang="en-US" sz="2000" kern="1200" dirty="0"/>
+            <a:t>in every publication</a:t>
           </a:r>
         </a:p>
       </dsp:txBody>
@@ -4262,7 +4276,7 @@
           <a:graphicData uri="http://schemas.openxmlformats.org/presentationml/2006/ole">
             <mc:AlternateContent xmlns:mc="http://schemas.openxmlformats.org/markup-compatibility/2006">
               <mc:Choice xmlns:v="urn:schemas-microsoft-com:vml" Requires="v">
-                <p:oleObj spid="_x0000_s2846" name="think-cell Folie" r:id="rId4" imgW="344" imgH="345" progId="TCLayout.ActiveDocument.1">
+                <p:oleObj spid="_x0000_s2847" name="think-cell Folie" r:id="rId4" imgW="344" imgH="345" progId="TCLayout.ActiveDocument.1">
                   <p:embed/>
                 </p:oleObj>
               </mc:Choice>
@@ -5714,7 +5728,7 @@
           <a:graphicData uri="http://schemas.openxmlformats.org/presentationml/2006/ole">
             <mc:AlternateContent xmlns:mc="http://schemas.openxmlformats.org/markup-compatibility/2006">
               <mc:Choice xmlns:v="urn:schemas-microsoft-com:vml" Requires="v">
-                <p:oleObj spid="_x0000_s6942" name="think-cell Folie" r:id="rId4" imgW="344" imgH="345" progId="TCLayout.ActiveDocument.1">
+                <p:oleObj spid="_x0000_s6943" name="think-cell Folie" r:id="rId4" imgW="344" imgH="345" progId="TCLayout.ActiveDocument.1">
                   <p:embed/>
                 </p:oleObj>
               </mc:Choice>
@@ -7128,7 +7142,7 @@
           <a:graphicData uri="http://schemas.openxmlformats.org/presentationml/2006/ole">
             <mc:AlternateContent xmlns:mc="http://schemas.openxmlformats.org/markup-compatibility/2006">
               <mc:Choice xmlns:v="urn:schemas-microsoft-com:vml" Requires="v">
-                <p:oleObj spid="_x0000_s3870" name="think-cell Folie" r:id="rId4" imgW="344" imgH="345" progId="TCLayout.ActiveDocument.1">
+                <p:oleObj spid="_x0000_s3871" name="think-cell Folie" r:id="rId4" imgW="344" imgH="345" progId="TCLayout.ActiveDocument.1">
                   <p:embed/>
                 </p:oleObj>
               </mc:Choice>
@@ -8033,7 +8047,7 @@
           <a:graphicData uri="http://schemas.openxmlformats.org/presentationml/2006/ole">
             <mc:AlternateContent xmlns:mc="http://schemas.openxmlformats.org/markup-compatibility/2006">
               <mc:Choice xmlns:v="urn:schemas-microsoft-com:vml" Requires="v">
-                <p:oleObj spid="_x0000_s4894" name="think-cell Folie" r:id="rId4" imgW="344" imgH="345" progId="TCLayout.ActiveDocument.1">
+                <p:oleObj spid="_x0000_s4895" name="think-cell Folie" r:id="rId4" imgW="344" imgH="345" progId="TCLayout.ActiveDocument.1">
                   <p:embed/>
                 </p:oleObj>
               </mc:Choice>
@@ -8879,7 +8893,7 @@
           <a:graphicData uri="http://schemas.openxmlformats.org/presentationml/2006/ole">
             <mc:AlternateContent xmlns:mc="http://schemas.openxmlformats.org/markup-compatibility/2006">
               <mc:Choice xmlns:v="urn:schemas-microsoft-com:vml" Requires="v">
-                <p:oleObj spid="_x0000_s7569" name="think-cell Folie" r:id="rId4" imgW="344" imgH="345" progId="TCLayout.ActiveDocument.1">
+                <p:oleObj spid="_x0000_s7570" name="think-cell Folie" r:id="rId4" imgW="344" imgH="345" progId="TCLayout.ActiveDocument.1">
                   <p:embed/>
                 </p:oleObj>
               </mc:Choice>
@@ -8981,7 +8995,7 @@
           <a:graphicData uri="http://schemas.openxmlformats.org/presentationml/2006/ole">
             <mc:AlternateContent xmlns:mc="http://schemas.openxmlformats.org/markup-compatibility/2006">
               <mc:Choice xmlns:v="urn:schemas-microsoft-com:vml" Requires="v">
-                <p:oleObj spid="_x0000_s5918" name="think-cell Folie" r:id="rId4" imgW="344" imgH="345" progId="TCLayout.ActiveDocument.1">
+                <p:oleObj spid="_x0000_s5919" name="think-cell Folie" r:id="rId4" imgW="344" imgH="345" progId="TCLayout.ActiveDocument.1">
                   <p:embed/>
                 </p:oleObj>
               </mc:Choice>
@@ -11376,7 +11390,7 @@
           <a:graphicData uri="http://schemas.openxmlformats.org/presentationml/2006/ole">
             <mc:AlternateContent xmlns:mc="http://schemas.openxmlformats.org/markup-compatibility/2006">
               <mc:Choice xmlns:v="urn:schemas-microsoft-com:vml" Requires="v">
-                <p:oleObj spid="_x0000_s1822" name="think-cell Folie" r:id="rId14" imgW="344" imgH="345" progId="TCLayout.ActiveDocument.1">
+                <p:oleObj spid="_x0000_s1823" name="think-cell Folie" r:id="rId14" imgW="344" imgH="345" progId="TCLayout.ActiveDocument.1">
                   <p:embed/>
                 </p:oleObj>
               </mc:Choice>
@@ -15061,7 +15075,7 @@
           <p:nvPr>
             <p:extLst>
               <p:ext uri="{D42A27DB-BD31-4B8C-83A1-F6EECF244321}">
-                <p14:modId xmlns:p14="http://schemas.microsoft.com/office/powerpoint/2010/main" val="3907200764"/>
+                <p14:modId xmlns:p14="http://schemas.microsoft.com/office/powerpoint/2010/main" val="1059533961"/>
               </p:ext>
             </p:extLst>
           </p:nvPr>

</xml_diff>